<commit_message>
Splash Screen + Icono Personalizado + Boton Ayuda + Show Alert co Informacion
</commit_message>
<xml_diff>
--- a/Presentaciones/Pantallas de la Aplicación Bonaduce.pptx
+++ b/Presentaciones/Pantallas de la Aplicación Bonaduce.pptx
@@ -6,14 +6,16 @@
   </p:sldMasterIdLst>
   <p:sldIdLst>
     <p:sldId id="256" r:id="rId2"/>
-    <p:sldId id="257" r:id="rId3"/>
-    <p:sldId id="258" r:id="rId4"/>
-    <p:sldId id="259" r:id="rId5"/>
-    <p:sldId id="260" r:id="rId6"/>
-    <p:sldId id="261" r:id="rId7"/>
-    <p:sldId id="262" r:id="rId8"/>
-    <p:sldId id="263" r:id="rId9"/>
-    <p:sldId id="264" r:id="rId10"/>
+    <p:sldId id="265" r:id="rId3"/>
+    <p:sldId id="257" r:id="rId4"/>
+    <p:sldId id="258" r:id="rId5"/>
+    <p:sldId id="259" r:id="rId6"/>
+    <p:sldId id="260" r:id="rId7"/>
+    <p:sldId id="266" r:id="rId8"/>
+    <p:sldId id="261" r:id="rId9"/>
+    <p:sldId id="262" r:id="rId10"/>
+    <p:sldId id="263" r:id="rId11"/>
+    <p:sldId id="264" r:id="rId12"/>
   </p:sldIdLst>
   <p:sldSz cx="12192000" cy="6858000"/>
   <p:notesSz cx="6858000" cy="9144000"/>
@@ -113,6 +115,11 @@
       </a:defRPr>
     </a:lvl9pPr>
   </p:defaultTextStyle>
+  <p:extLst>
+    <p:ext uri="{EFAFB233-063F-42B5-8137-9DF3F51BA10A}">
+      <p15:sldGuideLst xmlns:p15="http://schemas.microsoft.com/office/powerpoint/2012/main"/>
+    </p:ext>
+  </p:extLst>
 </p:presentation>
 </file>
 
@@ -247,7 +254,7 @@
           <a:p>
             <a:fld id="{0A38AF78-48E1-4681-9CBE-AE8A674A7468}" type="datetimeFigureOut">
               <a:rPr lang="es-AR" smtClean="0"/>
-              <a:t>4/11/2020</a:t>
+              <a:t>25/11/2020</a:t>
             </a:fld>
             <a:endParaRPr lang="es-AR"/>
           </a:p>
@@ -417,7 +424,7 @@
           <a:p>
             <a:fld id="{0A38AF78-48E1-4681-9CBE-AE8A674A7468}" type="datetimeFigureOut">
               <a:rPr lang="es-AR" smtClean="0"/>
-              <a:t>4/11/2020</a:t>
+              <a:t>25/11/2020</a:t>
             </a:fld>
             <a:endParaRPr lang="es-AR"/>
           </a:p>
@@ -597,7 +604,7 @@
           <a:p>
             <a:fld id="{0A38AF78-48E1-4681-9CBE-AE8A674A7468}" type="datetimeFigureOut">
               <a:rPr lang="es-AR" smtClean="0"/>
-              <a:t>4/11/2020</a:t>
+              <a:t>25/11/2020</a:t>
             </a:fld>
             <a:endParaRPr lang="es-AR"/>
           </a:p>
@@ -767,7 +774,7 @@
           <a:p>
             <a:fld id="{0A38AF78-48E1-4681-9CBE-AE8A674A7468}" type="datetimeFigureOut">
               <a:rPr lang="es-AR" smtClean="0"/>
-              <a:t>4/11/2020</a:t>
+              <a:t>25/11/2020</a:t>
             </a:fld>
             <a:endParaRPr lang="es-AR"/>
           </a:p>
@@ -1013,7 +1020,7 @@
           <a:p>
             <a:fld id="{0A38AF78-48E1-4681-9CBE-AE8A674A7468}" type="datetimeFigureOut">
               <a:rPr lang="es-AR" smtClean="0"/>
-              <a:t>4/11/2020</a:t>
+              <a:t>25/11/2020</a:t>
             </a:fld>
             <a:endParaRPr lang="es-AR"/>
           </a:p>
@@ -1245,7 +1252,7 @@
           <a:p>
             <a:fld id="{0A38AF78-48E1-4681-9CBE-AE8A674A7468}" type="datetimeFigureOut">
               <a:rPr lang="es-AR" smtClean="0"/>
-              <a:t>4/11/2020</a:t>
+              <a:t>25/11/2020</a:t>
             </a:fld>
             <a:endParaRPr lang="es-AR"/>
           </a:p>
@@ -1612,7 +1619,7 @@
           <a:p>
             <a:fld id="{0A38AF78-48E1-4681-9CBE-AE8A674A7468}" type="datetimeFigureOut">
               <a:rPr lang="es-AR" smtClean="0"/>
-              <a:t>4/11/2020</a:t>
+              <a:t>25/11/2020</a:t>
             </a:fld>
             <a:endParaRPr lang="es-AR"/>
           </a:p>
@@ -1730,7 +1737,7 @@
           <a:p>
             <a:fld id="{0A38AF78-48E1-4681-9CBE-AE8A674A7468}" type="datetimeFigureOut">
               <a:rPr lang="es-AR" smtClean="0"/>
-              <a:t>4/11/2020</a:t>
+              <a:t>25/11/2020</a:t>
             </a:fld>
             <a:endParaRPr lang="es-AR"/>
           </a:p>
@@ -1825,7 +1832,7 @@
           <a:p>
             <a:fld id="{0A38AF78-48E1-4681-9CBE-AE8A674A7468}" type="datetimeFigureOut">
               <a:rPr lang="es-AR" smtClean="0"/>
-              <a:t>4/11/2020</a:t>
+              <a:t>25/11/2020</a:t>
             </a:fld>
             <a:endParaRPr lang="es-AR"/>
           </a:p>
@@ -2102,7 +2109,7 @@
           <a:p>
             <a:fld id="{0A38AF78-48E1-4681-9CBE-AE8A674A7468}" type="datetimeFigureOut">
               <a:rPr lang="es-AR" smtClean="0"/>
-              <a:t>4/11/2020</a:t>
+              <a:t>25/11/2020</a:t>
             </a:fld>
             <a:endParaRPr lang="es-AR"/>
           </a:p>
@@ -2355,7 +2362,7 @@
           <a:p>
             <a:fld id="{0A38AF78-48E1-4681-9CBE-AE8A674A7468}" type="datetimeFigureOut">
               <a:rPr lang="es-AR" smtClean="0"/>
-              <a:t>4/11/2020</a:t>
+              <a:t>25/11/2020</a:t>
             </a:fld>
             <a:endParaRPr lang="es-AR"/>
           </a:p>
@@ -2568,7 +2575,7 @@
           <a:p>
             <a:fld id="{0A38AF78-48E1-4681-9CBE-AE8A674A7468}" type="datetimeFigureOut">
               <a:rPr lang="es-AR" smtClean="0"/>
-              <a:t>4/11/2020</a:t>
+              <a:t>25/11/2020</a:t>
             </a:fld>
             <a:endParaRPr lang="es-AR"/>
           </a:p>
@@ -3081,7 +3088,256 @@
 </p:sld>
 </file>
 
+<file path=ppt/slides/slide10.xml><?xml version="1.0" encoding="utf-8"?>
+<p:sld xmlns:a="http://schemas.openxmlformats.org/drawingml/2006/main" xmlns:r="http://schemas.openxmlformats.org/officeDocument/2006/relationships" xmlns:p="http://schemas.openxmlformats.org/presentationml/2006/main">
+  <p:cSld>
+    <p:spTree>
+      <p:nvGrpSpPr>
+        <p:cNvPr id="1" name=""/>
+        <p:cNvGrpSpPr/>
+        <p:nvPr/>
+      </p:nvGrpSpPr>
+      <p:grpSpPr>
+        <a:xfrm>
+          <a:off x="0" y="0"/>
+          <a:ext cx="0" cy="0"/>
+          <a:chOff x="0" y="0"/>
+          <a:chExt cx="0" cy="0"/>
+        </a:xfrm>
+      </p:grpSpPr>
+      <p:pic>
+        <p:nvPicPr>
+          <p:cNvPr id="2" name="Imagen 1" descr="7"/>
+          <p:cNvPicPr>
+            <a:picLocks noGrp="1" noChangeAspect="1"/>
+          </p:cNvPicPr>
+          <p:nvPr isPhoto="1"/>
+        </p:nvPicPr>
+        <p:blipFill>
+          <a:blip r:embed="rId2">
+            <a:lum/>
+            <a:extLst>
+              <a:ext uri="{28A0092B-C50C-407E-A947-70E740481C1C}">
+                <a14:useLocalDpi xmlns:a14="http://schemas.microsoft.com/office/drawing/2010/main" val="0"/>
+              </a:ext>
+            </a:extLst>
+          </a:blip>
+          <a:stretch>
+            <a:fillRect/>
+          </a:stretch>
+        </p:blipFill>
+        <p:spPr>
+          <a:xfrm>
+            <a:off x="4167188" y="0"/>
+            <a:ext cx="3857625" cy="6858000"/>
+          </a:xfrm>
+          <a:prstGeom prst="rect">
+            <a:avLst/>
+          </a:prstGeom>
+        </p:spPr>
+      </p:pic>
+    </p:spTree>
+    <p:extLst>
+      <p:ext uri="{BB962C8B-B14F-4D97-AF65-F5344CB8AC3E}">
+        <p14:creationId xmlns:p14="http://schemas.microsoft.com/office/powerpoint/2010/main" val="321450247"/>
+      </p:ext>
+    </p:extLst>
+  </p:cSld>
+  <p:clrMapOvr>
+    <a:masterClrMapping/>
+  </p:clrMapOvr>
+  <mc:AlternateContent xmlns:mc="http://schemas.openxmlformats.org/markup-compatibility/2006" xmlns:p14="http://schemas.microsoft.com/office/powerpoint/2010/main">
+    <mc:Choice Requires="p14">
+      <p:transition spd="slow" p14:dur="1500" advClick="0" advTm="3000">
+        <p:split orient="vert"/>
+      </p:transition>
+    </mc:Choice>
+    <mc:Fallback xmlns="">
+      <p:transition spd="slow" advClick="0" advTm="3000">
+        <p:split orient="vert"/>
+      </p:transition>
+    </mc:Fallback>
+  </mc:AlternateContent>
+  <p:timing>
+    <p:tnLst>
+      <p:par>
+        <p:cTn id="1" dur="indefinite" restart="never" nodeType="tmRoot"/>
+      </p:par>
+    </p:tnLst>
+  </p:timing>
+</p:sld>
+</file>
+
+<file path=ppt/slides/slide11.xml><?xml version="1.0" encoding="utf-8"?>
+<p:sld xmlns:a="http://schemas.openxmlformats.org/drawingml/2006/main" xmlns:r="http://schemas.openxmlformats.org/officeDocument/2006/relationships" xmlns:p="http://schemas.openxmlformats.org/presentationml/2006/main">
+  <p:cSld>
+    <p:spTree>
+      <p:nvGrpSpPr>
+        <p:cNvPr id="1" name=""/>
+        <p:cNvGrpSpPr/>
+        <p:nvPr/>
+      </p:nvGrpSpPr>
+      <p:grpSpPr>
+        <a:xfrm>
+          <a:off x="0" y="0"/>
+          <a:ext cx="0" cy="0"/>
+          <a:chOff x="0" y="0"/>
+          <a:chExt cx="0" cy="0"/>
+        </a:xfrm>
+      </p:grpSpPr>
+      <p:pic>
+        <p:nvPicPr>
+          <p:cNvPr id="2" name="Imagen 1" descr="8"/>
+          <p:cNvPicPr>
+            <a:picLocks noGrp="1" noChangeAspect="1"/>
+          </p:cNvPicPr>
+          <p:nvPr isPhoto="1"/>
+        </p:nvPicPr>
+        <p:blipFill>
+          <a:blip r:embed="rId3">
+            <a:lum/>
+            <a:extLst>
+              <a:ext uri="{28A0092B-C50C-407E-A947-70E740481C1C}">
+                <a14:useLocalDpi xmlns:a14="http://schemas.microsoft.com/office/drawing/2010/main" val="0"/>
+              </a:ext>
+            </a:extLst>
+          </a:blip>
+          <a:stretch>
+            <a:fillRect/>
+          </a:stretch>
+        </p:blipFill>
+        <p:spPr>
+          <a:xfrm>
+            <a:off x="4167188" y="0"/>
+            <a:ext cx="3857625" cy="6858000"/>
+          </a:xfrm>
+          <a:prstGeom prst="rect">
+            <a:avLst/>
+          </a:prstGeom>
+        </p:spPr>
+      </p:pic>
+    </p:spTree>
+    <p:extLst>
+      <p:ext uri="{BB962C8B-B14F-4D97-AF65-F5344CB8AC3E}">
+        <p14:creationId xmlns:p14="http://schemas.microsoft.com/office/powerpoint/2010/main" val="2977482267"/>
+      </p:ext>
+    </p:extLst>
+  </p:cSld>
+  <p:clrMapOvr>
+    <a:masterClrMapping/>
+  </p:clrMapOvr>
+  <mc:AlternateContent xmlns:mc="http://schemas.openxmlformats.org/markup-compatibility/2006" xmlns:p14="http://schemas.microsoft.com/office/powerpoint/2010/main">
+    <mc:Choice Requires="p14">
+      <p:transition spd="slow" p14:dur="1500" advTm="3000">
+        <p:split orient="vert"/>
+        <p:sndAc>
+          <p:stSnd>
+            <p:snd r:embed="rId2" name="applause.wav"/>
+          </p:stSnd>
+        </p:sndAc>
+      </p:transition>
+    </mc:Choice>
+    <mc:Fallback xmlns="">
+      <p:transition spd="slow" advTm="3000">
+        <p:split orient="vert"/>
+        <p:sndAc>
+          <p:stSnd>
+            <p:snd r:embed="rId4" name="applause.wav"/>
+          </p:stSnd>
+        </p:sndAc>
+      </p:transition>
+    </mc:Fallback>
+  </mc:AlternateContent>
+  <p:timing>
+    <p:tnLst>
+      <p:par>
+        <p:cTn id="1" dur="indefinite" restart="never" nodeType="tmRoot"/>
+      </p:par>
+    </p:tnLst>
+  </p:timing>
+</p:sld>
+</file>
+
 <file path=ppt/slides/slide2.xml><?xml version="1.0" encoding="utf-8"?>
+<p:sld xmlns:a="http://schemas.openxmlformats.org/drawingml/2006/main" xmlns:r="http://schemas.openxmlformats.org/officeDocument/2006/relationships" xmlns:p="http://schemas.openxmlformats.org/presentationml/2006/main">
+  <p:cSld>
+    <p:spTree>
+      <p:nvGrpSpPr>
+        <p:cNvPr id="1" name=""/>
+        <p:cNvGrpSpPr/>
+        <p:nvPr/>
+      </p:nvGrpSpPr>
+      <p:grpSpPr>
+        <a:xfrm>
+          <a:off x="0" y="0"/>
+          <a:ext cx="0" cy="0"/>
+          <a:chOff x="0" y="0"/>
+          <a:chExt cx="0" cy="0"/>
+        </a:xfrm>
+      </p:grpSpPr>
+      <p:pic>
+        <p:nvPicPr>
+          <p:cNvPr id="4" name="Imagen 3"/>
+          <p:cNvPicPr>
+            <a:picLocks noChangeAspect="1"/>
+          </p:cNvPicPr>
+          <p:nvPr/>
+        </p:nvPicPr>
+        <p:blipFill>
+          <a:blip r:embed="rId2" cstate="print">
+            <a:extLst>
+              <a:ext uri="{28A0092B-C50C-407E-A947-70E740481C1C}">
+                <a14:useLocalDpi xmlns:a14="http://schemas.microsoft.com/office/drawing/2010/main" val="0"/>
+              </a:ext>
+            </a:extLst>
+          </a:blip>
+          <a:stretch>
+            <a:fillRect/>
+          </a:stretch>
+        </p:blipFill>
+        <p:spPr>
+          <a:xfrm>
+            <a:off x="4167187" y="0"/>
+            <a:ext cx="3857625" cy="6858000"/>
+          </a:xfrm>
+          <a:prstGeom prst="rect">
+            <a:avLst/>
+          </a:prstGeom>
+        </p:spPr>
+      </p:pic>
+    </p:spTree>
+    <p:extLst>
+      <p:ext uri="{BB962C8B-B14F-4D97-AF65-F5344CB8AC3E}">
+        <p14:creationId xmlns:p14="http://schemas.microsoft.com/office/powerpoint/2010/main" val="1646481479"/>
+      </p:ext>
+    </p:extLst>
+  </p:cSld>
+  <p:clrMapOvr>
+    <a:masterClrMapping/>
+  </p:clrMapOvr>
+  <mc:AlternateContent xmlns:mc="http://schemas.openxmlformats.org/markup-compatibility/2006">
+    <mc:Choice xmlns:p15="http://schemas.microsoft.com/office/powerpoint/2012/main" Requires="p15">
+      <p:transition xmlns:p14="http://schemas.microsoft.com/office/powerpoint/2010/main" spd="slow" p14:dur="2000">
+        <p15:prstTrans prst="crush"/>
+      </p:transition>
+    </mc:Choice>
+    <mc:Fallback>
+      <p:transition spd="slow">
+        <p:fade/>
+      </p:transition>
+    </mc:Fallback>
+  </mc:AlternateContent>
+  <p:timing>
+    <p:tnLst>
+      <p:par>
+        <p:cTn id="1" dur="indefinite" restart="never" nodeType="tmRoot"/>
+      </p:par>
+    </p:tnLst>
+  </p:timing>
+</p:sld>
+</file>
+
+<file path=ppt/slides/slide3.xml><?xml version="1.0" encoding="utf-8"?>
 <p:sld xmlns:a="http://schemas.openxmlformats.org/drawingml/2006/main" xmlns:r="http://schemas.openxmlformats.org/officeDocument/2006/relationships" xmlns:p="http://schemas.openxmlformats.org/presentationml/2006/main">
   <p:cSld>
     <p:spTree>
@@ -3140,14 +3396,14 @@
     <a:masterClrMapping/>
   </p:clrMapOvr>
   <mc:AlternateContent xmlns:mc="http://schemas.openxmlformats.org/markup-compatibility/2006">
-    <mc:Choice xmlns:p14="http://schemas.microsoft.com/office/powerpoint/2010/main" Requires="p14">
-      <p:transition spd="slow" p14:dur="1500" advClick="0" advTm="3000">
-        <p:split orient="vert"/>
+    <mc:Choice xmlns:p15="http://schemas.microsoft.com/office/powerpoint/2012/main" Requires="p15">
+      <p:transition xmlns:p14="http://schemas.microsoft.com/office/powerpoint/2010/main" spd="slow" p14:dur="1250" advClick="0" advTm="3000">
+        <p15:prstTrans prst="airplane"/>
       </p:transition>
     </mc:Choice>
     <mc:Fallback>
       <p:transition spd="slow" advClick="0" advTm="3000">
-        <p:split orient="vert"/>
+        <p:fade/>
       </p:transition>
     </mc:Fallback>
   </mc:AlternateContent>
@@ -3161,7 +3417,7 @@
 </p:sld>
 </file>
 
-<file path=ppt/slides/slide3.xml><?xml version="1.0" encoding="utf-8"?>
+<file path=ppt/slides/slide4.xml><?xml version="1.0" encoding="utf-8"?>
 <p:sld xmlns:a="http://schemas.openxmlformats.org/drawingml/2006/main" xmlns:r="http://schemas.openxmlformats.org/officeDocument/2006/relationships" xmlns:p="http://schemas.openxmlformats.org/presentationml/2006/main">
   <p:cSld>
     <p:spTree>
@@ -3219,13 +3475,13 @@
   <p:clrMapOvr>
     <a:masterClrMapping/>
   </p:clrMapOvr>
-  <mc:AlternateContent xmlns:mc="http://schemas.openxmlformats.org/markup-compatibility/2006">
-    <mc:Choice xmlns:p14="http://schemas.microsoft.com/office/powerpoint/2010/main" Requires="p14">
+  <mc:AlternateContent xmlns:mc="http://schemas.openxmlformats.org/markup-compatibility/2006" xmlns:p14="http://schemas.microsoft.com/office/powerpoint/2010/main">
+    <mc:Choice Requires="p14">
       <p:transition spd="slow" p14:dur="1500" advClick="0" advTm="3000">
         <p:split orient="vert"/>
       </p:transition>
     </mc:Choice>
-    <mc:Fallback>
+    <mc:Fallback xmlns="">
       <p:transition spd="slow" advClick="0" advTm="3000">
         <p:split orient="vert"/>
       </p:transition>
@@ -3241,7 +3497,7 @@
 </p:sld>
 </file>
 
-<file path=ppt/slides/slide4.xml><?xml version="1.0" encoding="utf-8"?>
+<file path=ppt/slides/slide5.xml><?xml version="1.0" encoding="utf-8"?>
 <p:sld xmlns:a="http://schemas.openxmlformats.org/drawingml/2006/main" xmlns:r="http://schemas.openxmlformats.org/officeDocument/2006/relationships" xmlns:p="http://schemas.openxmlformats.org/presentationml/2006/main">
   <p:cSld>
     <p:spTree>
@@ -3299,13 +3555,13 @@
   <p:clrMapOvr>
     <a:masterClrMapping/>
   </p:clrMapOvr>
-  <mc:AlternateContent xmlns:mc="http://schemas.openxmlformats.org/markup-compatibility/2006">
-    <mc:Choice xmlns:p14="http://schemas.microsoft.com/office/powerpoint/2010/main" Requires="p14">
+  <mc:AlternateContent xmlns:mc="http://schemas.openxmlformats.org/markup-compatibility/2006" xmlns:p14="http://schemas.microsoft.com/office/powerpoint/2010/main">
+    <mc:Choice Requires="p14">
       <p:transition spd="slow" p14:dur="1500" advClick="0" advTm="3000">
         <p:split orient="vert"/>
       </p:transition>
     </mc:Choice>
-    <mc:Fallback>
+    <mc:Fallback xmlns="">
       <p:transition spd="slow" advClick="0" advTm="3000">
         <p:split orient="vert"/>
       </p:transition>
@@ -3321,7 +3577,7 @@
 </p:sld>
 </file>
 
-<file path=ppt/slides/slide5.xml><?xml version="1.0" encoding="utf-8"?>
+<file path=ppt/slides/slide6.xml><?xml version="1.0" encoding="utf-8"?>
 <p:sld xmlns:a="http://schemas.openxmlformats.org/drawingml/2006/main" xmlns:r="http://schemas.openxmlformats.org/officeDocument/2006/relationships" xmlns:p="http://schemas.openxmlformats.org/presentationml/2006/main">
   <p:cSld>
     <p:spTree>
@@ -3340,15 +3596,14 @@
       </p:grpSpPr>
       <p:pic>
         <p:nvPicPr>
-          <p:cNvPr id="2" name="Imagen 1" descr="4"/>
+          <p:cNvPr id="3" name="Imagen 2"/>
           <p:cNvPicPr>
-            <a:picLocks noGrp="1" noChangeAspect="1"/>
+            <a:picLocks noChangeAspect="1"/>
           </p:cNvPicPr>
-          <p:nvPr isPhoto="1"/>
+          <p:nvPr/>
         </p:nvPicPr>
         <p:blipFill>
-          <a:blip r:embed="rId2" cstate="print">
-            <a:lum/>
+          <a:blip r:embed="rId2">
             <a:extLst>
               <a:ext uri="{28A0092B-C50C-407E-A947-70E740481C1C}">
                 <a14:useLocalDpi xmlns:a14="http://schemas.microsoft.com/office/drawing/2010/main" val="0"/>
@@ -3361,7 +3616,7 @@
         </p:blipFill>
         <p:spPr>
           <a:xfrm>
-            <a:off x="4167188" y="0"/>
+            <a:off x="4167187" y="0"/>
             <a:ext cx="3857625" cy="6858000"/>
           </a:xfrm>
           <a:prstGeom prst="rect">
@@ -3379,13 +3634,13 @@
   <p:clrMapOvr>
     <a:masterClrMapping/>
   </p:clrMapOvr>
-  <mc:AlternateContent xmlns:mc="http://schemas.openxmlformats.org/markup-compatibility/2006">
-    <mc:Choice xmlns:p14="http://schemas.microsoft.com/office/powerpoint/2010/main" Requires="p14">
+  <mc:AlternateContent xmlns:mc="http://schemas.openxmlformats.org/markup-compatibility/2006" xmlns:p14="http://schemas.microsoft.com/office/powerpoint/2010/main">
+    <mc:Choice Requires="p14">
       <p:transition spd="slow" p14:dur="1500" advClick="0" advTm="3000">
         <p:split orient="vert"/>
       </p:transition>
     </mc:Choice>
-    <mc:Fallback>
+    <mc:Fallback xmlns="">
       <p:transition spd="slow" advClick="0" advTm="3000">
         <p:split orient="vert"/>
       </p:transition>
@@ -3401,7 +3656,86 @@
 </p:sld>
 </file>
 
-<file path=ppt/slides/slide6.xml><?xml version="1.0" encoding="utf-8"?>
+<file path=ppt/slides/slide7.xml><?xml version="1.0" encoding="utf-8"?>
+<p:sld xmlns:a="http://schemas.openxmlformats.org/drawingml/2006/main" xmlns:r="http://schemas.openxmlformats.org/officeDocument/2006/relationships" xmlns:p="http://schemas.openxmlformats.org/presentationml/2006/main">
+  <p:cSld>
+    <p:spTree>
+      <p:nvGrpSpPr>
+        <p:cNvPr id="1" name=""/>
+        <p:cNvGrpSpPr/>
+        <p:nvPr/>
+      </p:nvGrpSpPr>
+      <p:grpSpPr>
+        <a:xfrm>
+          <a:off x="0" y="0"/>
+          <a:ext cx="0" cy="0"/>
+          <a:chOff x="0" y="0"/>
+          <a:chExt cx="0" cy="0"/>
+        </a:xfrm>
+      </p:grpSpPr>
+      <p:pic>
+        <p:nvPicPr>
+          <p:cNvPr id="2" name="Imagen 1"/>
+          <p:cNvPicPr>
+            <a:picLocks noChangeAspect="1"/>
+          </p:cNvPicPr>
+          <p:nvPr/>
+        </p:nvPicPr>
+        <p:blipFill>
+          <a:blip r:embed="rId2">
+            <a:extLst>
+              <a:ext uri="{28A0092B-C50C-407E-A947-70E740481C1C}">
+                <a14:useLocalDpi xmlns:a14="http://schemas.microsoft.com/office/drawing/2010/main" val="0"/>
+              </a:ext>
+            </a:extLst>
+          </a:blip>
+          <a:stretch>
+            <a:fillRect/>
+          </a:stretch>
+        </p:blipFill>
+        <p:spPr>
+          <a:xfrm>
+            <a:off x="4167187" y="0"/>
+            <a:ext cx="3857625" cy="6858000"/>
+          </a:xfrm>
+          <a:prstGeom prst="rect">
+            <a:avLst/>
+          </a:prstGeom>
+        </p:spPr>
+      </p:pic>
+    </p:spTree>
+    <p:extLst>
+      <p:ext uri="{BB962C8B-B14F-4D97-AF65-F5344CB8AC3E}">
+        <p14:creationId xmlns:p14="http://schemas.microsoft.com/office/powerpoint/2010/main" val="2000863043"/>
+      </p:ext>
+    </p:extLst>
+  </p:cSld>
+  <p:clrMapOvr>
+    <a:masterClrMapping/>
+  </p:clrMapOvr>
+  <mc:AlternateContent xmlns:mc="http://schemas.openxmlformats.org/markup-compatibility/2006">
+    <mc:Choice xmlns:p15="http://schemas.microsoft.com/office/powerpoint/2012/main" Requires="p15">
+      <p:transition xmlns:p14="http://schemas.microsoft.com/office/powerpoint/2010/main" spd="slow" p14:dur="2000">
+        <p15:prstTrans prst="crush"/>
+      </p:transition>
+    </mc:Choice>
+    <mc:Fallback>
+      <p:transition spd="slow">
+        <p:fade/>
+      </p:transition>
+    </mc:Fallback>
+  </mc:AlternateContent>
+  <p:timing>
+    <p:tnLst>
+      <p:par>
+        <p:cTn id="1" dur="indefinite" restart="never" nodeType="tmRoot"/>
+      </p:par>
+    </p:tnLst>
+  </p:timing>
+</p:sld>
+</file>
+
+<file path=ppt/slides/slide8.xml><?xml version="1.0" encoding="utf-8"?>
 <p:sld xmlns:a="http://schemas.openxmlformats.org/drawingml/2006/main" xmlns:r="http://schemas.openxmlformats.org/officeDocument/2006/relationships" xmlns:p="http://schemas.openxmlformats.org/presentationml/2006/main">
   <p:cSld>
     <p:spTree>
@@ -3459,13 +3793,13 @@
   <p:clrMapOvr>
     <a:masterClrMapping/>
   </p:clrMapOvr>
-  <mc:AlternateContent xmlns:mc="http://schemas.openxmlformats.org/markup-compatibility/2006">
-    <mc:Choice xmlns:p14="http://schemas.microsoft.com/office/powerpoint/2010/main" Requires="p14">
+  <mc:AlternateContent xmlns:mc="http://schemas.openxmlformats.org/markup-compatibility/2006" xmlns:p14="http://schemas.microsoft.com/office/powerpoint/2010/main">
+    <mc:Choice Requires="p14">
       <p:transition spd="slow" p14:dur="1500" advClick="0" advTm="3000">
         <p:split orient="vert"/>
       </p:transition>
     </mc:Choice>
-    <mc:Fallback>
+    <mc:Fallback xmlns="">
       <p:transition spd="slow" advClick="0" advTm="3000">
         <p:split orient="vert"/>
       </p:transition>
@@ -3481,7 +3815,7 @@
 </p:sld>
 </file>
 
-<file path=ppt/slides/slide7.xml><?xml version="1.0" encoding="utf-8"?>
+<file path=ppt/slides/slide9.xml><?xml version="1.0" encoding="utf-8"?>
 <p:sld xmlns:a="http://schemas.openxmlformats.org/drawingml/2006/main" xmlns:r="http://schemas.openxmlformats.org/officeDocument/2006/relationships" xmlns:p="http://schemas.openxmlformats.org/presentationml/2006/main">
   <p:cSld>
     <p:spTree>
@@ -3539,185 +3873,15 @@
   <p:clrMapOvr>
     <a:masterClrMapping/>
   </p:clrMapOvr>
-  <mc:AlternateContent xmlns:mc="http://schemas.openxmlformats.org/markup-compatibility/2006">
-    <mc:Choice xmlns:p14="http://schemas.microsoft.com/office/powerpoint/2010/main" Requires="p14">
+  <mc:AlternateContent xmlns:mc="http://schemas.openxmlformats.org/markup-compatibility/2006" xmlns:p14="http://schemas.microsoft.com/office/powerpoint/2010/main">
+    <mc:Choice Requires="p14">
       <p:transition spd="slow" p14:dur="1500" advClick="0" advTm="3000">
         <p:split orient="vert"/>
       </p:transition>
     </mc:Choice>
-    <mc:Fallback>
+    <mc:Fallback xmlns="">
       <p:transition spd="slow" advClick="0" advTm="3000">
         <p:split orient="vert"/>
-      </p:transition>
-    </mc:Fallback>
-  </mc:AlternateContent>
-  <p:timing>
-    <p:tnLst>
-      <p:par>
-        <p:cTn id="1" dur="indefinite" restart="never" nodeType="tmRoot"/>
-      </p:par>
-    </p:tnLst>
-  </p:timing>
-</p:sld>
-</file>
-
-<file path=ppt/slides/slide8.xml><?xml version="1.0" encoding="utf-8"?>
-<p:sld xmlns:a="http://schemas.openxmlformats.org/drawingml/2006/main" xmlns:r="http://schemas.openxmlformats.org/officeDocument/2006/relationships" xmlns:p="http://schemas.openxmlformats.org/presentationml/2006/main">
-  <p:cSld>
-    <p:spTree>
-      <p:nvGrpSpPr>
-        <p:cNvPr id="1" name=""/>
-        <p:cNvGrpSpPr/>
-        <p:nvPr/>
-      </p:nvGrpSpPr>
-      <p:grpSpPr>
-        <a:xfrm>
-          <a:off x="0" y="0"/>
-          <a:ext cx="0" cy="0"/>
-          <a:chOff x="0" y="0"/>
-          <a:chExt cx="0" cy="0"/>
-        </a:xfrm>
-      </p:grpSpPr>
-      <p:pic>
-        <p:nvPicPr>
-          <p:cNvPr id="2" name="Imagen 1" descr="7"/>
-          <p:cNvPicPr>
-            <a:picLocks noGrp="1" noChangeAspect="1"/>
-          </p:cNvPicPr>
-          <p:nvPr isPhoto="1"/>
-        </p:nvPicPr>
-        <p:blipFill>
-          <a:blip r:embed="rId2">
-            <a:lum/>
-            <a:extLst>
-              <a:ext uri="{28A0092B-C50C-407E-A947-70E740481C1C}">
-                <a14:useLocalDpi xmlns:a14="http://schemas.microsoft.com/office/drawing/2010/main" val="0"/>
-              </a:ext>
-            </a:extLst>
-          </a:blip>
-          <a:stretch>
-            <a:fillRect/>
-          </a:stretch>
-        </p:blipFill>
-        <p:spPr>
-          <a:xfrm>
-            <a:off x="4167188" y="0"/>
-            <a:ext cx="3857625" cy="6858000"/>
-          </a:xfrm>
-          <a:prstGeom prst="rect">
-            <a:avLst/>
-          </a:prstGeom>
-        </p:spPr>
-      </p:pic>
-    </p:spTree>
-    <p:extLst>
-      <p:ext uri="{BB962C8B-B14F-4D97-AF65-F5344CB8AC3E}">
-        <p14:creationId xmlns:p14="http://schemas.microsoft.com/office/powerpoint/2010/main" val="321450247"/>
-      </p:ext>
-    </p:extLst>
-  </p:cSld>
-  <p:clrMapOvr>
-    <a:masterClrMapping/>
-  </p:clrMapOvr>
-  <mc:AlternateContent xmlns:mc="http://schemas.openxmlformats.org/markup-compatibility/2006">
-    <mc:Choice xmlns:p14="http://schemas.microsoft.com/office/powerpoint/2010/main" Requires="p14">
-      <p:transition spd="slow" p14:dur="1500" advClick="0" advTm="3000">
-        <p:split orient="vert"/>
-      </p:transition>
-    </mc:Choice>
-    <mc:Fallback>
-      <p:transition spd="slow" advClick="0" advTm="3000">
-        <p:split orient="vert"/>
-      </p:transition>
-    </mc:Fallback>
-  </mc:AlternateContent>
-  <p:timing>
-    <p:tnLst>
-      <p:par>
-        <p:cTn id="1" dur="indefinite" restart="never" nodeType="tmRoot"/>
-      </p:par>
-    </p:tnLst>
-  </p:timing>
-</p:sld>
-</file>
-
-<file path=ppt/slides/slide9.xml><?xml version="1.0" encoding="utf-8"?>
-<p:sld xmlns:a="http://schemas.openxmlformats.org/drawingml/2006/main" xmlns:r="http://schemas.openxmlformats.org/officeDocument/2006/relationships" xmlns:p="http://schemas.openxmlformats.org/presentationml/2006/main">
-  <p:cSld>
-    <p:spTree>
-      <p:nvGrpSpPr>
-        <p:cNvPr id="1" name=""/>
-        <p:cNvGrpSpPr/>
-        <p:nvPr/>
-      </p:nvGrpSpPr>
-      <p:grpSpPr>
-        <a:xfrm>
-          <a:off x="0" y="0"/>
-          <a:ext cx="0" cy="0"/>
-          <a:chOff x="0" y="0"/>
-          <a:chExt cx="0" cy="0"/>
-        </a:xfrm>
-      </p:grpSpPr>
-      <p:pic>
-        <p:nvPicPr>
-          <p:cNvPr id="2" name="Imagen 1" descr="8"/>
-          <p:cNvPicPr>
-            <a:picLocks noGrp="1" noChangeAspect="1"/>
-          </p:cNvPicPr>
-          <p:nvPr isPhoto="1"/>
-        </p:nvPicPr>
-        <p:blipFill>
-          <a:blip r:embed="rId3">
-            <a:lum/>
-            <a:extLst>
-              <a:ext uri="{28A0092B-C50C-407E-A947-70E740481C1C}">
-                <a14:useLocalDpi xmlns:a14="http://schemas.microsoft.com/office/drawing/2010/main" val="0"/>
-              </a:ext>
-            </a:extLst>
-          </a:blip>
-          <a:stretch>
-            <a:fillRect/>
-          </a:stretch>
-        </p:blipFill>
-        <p:spPr>
-          <a:xfrm>
-            <a:off x="4167188" y="0"/>
-            <a:ext cx="3857625" cy="6858000"/>
-          </a:xfrm>
-          <a:prstGeom prst="rect">
-            <a:avLst/>
-          </a:prstGeom>
-        </p:spPr>
-      </p:pic>
-    </p:spTree>
-    <p:extLst>
-      <p:ext uri="{BB962C8B-B14F-4D97-AF65-F5344CB8AC3E}">
-        <p14:creationId xmlns:p14="http://schemas.microsoft.com/office/powerpoint/2010/main" val="2977482267"/>
-      </p:ext>
-    </p:extLst>
-  </p:cSld>
-  <p:clrMapOvr>
-    <a:masterClrMapping/>
-  </p:clrMapOvr>
-  <mc:AlternateContent xmlns:mc="http://schemas.openxmlformats.org/markup-compatibility/2006">
-    <mc:Choice xmlns:p14="http://schemas.microsoft.com/office/powerpoint/2010/main" Requires="p14">
-      <p:transition spd="slow" p14:dur="1500" advTm="3000">
-        <p:split orient="vert"/>
-        <p:sndAc>
-          <p:stSnd>
-            <p:snd r:embed="rId2" name="applause.wav"/>
-          </p:stSnd>
-        </p:sndAc>
-      </p:transition>
-    </mc:Choice>
-    <mc:Fallback>
-      <p:transition spd="slow" advTm="3000">
-        <p:split orient="vert"/>
-        <p:sndAc>
-          <p:stSnd>
-            <p:snd r:embed="rId2" name="applause.wav"/>
-          </p:stSnd>
-        </p:sndAc>
       </p:transition>
     </mc:Fallback>
   </mc:AlternateContent>

</xml_diff>